<commit_message>
Updated Deck for solution
</commit_message>
<xml_diff>
--- a/Twitter Customer Reviews Analysis.pptx
+++ b/Twitter Customer Reviews Analysis.pptx
@@ -11701,7 +11701,6 @@
           <a:p>
             <a:r>
               <a:rPr lang="en-IN" altLang="en-US" sz="3600">
-                <a:ln/>
                 <a:solidFill>
                   <a:schemeClr val="accent1"/>
                 </a:solidFill>
@@ -11716,7 +11715,6 @@
               <a:t>Twitter Data Analysis</a:t>
             </a:r>
             <a:endParaRPr lang="en-IN" altLang="en-US" sz="3600">
-              <a:ln/>
               <a:solidFill>
                 <a:schemeClr val="accent1"/>
               </a:solidFill>
@@ -13496,8 +13494,8 @@
         </p:nvSpPr>
         <p:spPr bwMode="auto">
           <a:xfrm>
-            <a:off x="267971" y="3070093"/>
-            <a:ext cx="11542679" cy="2221236"/>
+            <a:off x="248920" y="3070225"/>
+            <a:ext cx="11542395" cy="774065"/>
           </a:xfrm>
           <a:prstGeom prst="rect">
             <a:avLst/>
@@ -13528,7 +13526,7 @@
         </p:nvSpPr>
         <p:spPr>
           <a:xfrm>
-            <a:off x="1589" y="2843082"/>
+            <a:off x="1589" y="2723702"/>
             <a:ext cx="3740619" cy="468313"/>
           </a:xfrm>
           <a:custGeom>
@@ -13724,7 +13722,7 @@
         </p:nvSpPr>
         <p:spPr>
           <a:xfrm>
-            <a:off x="335280" y="3502762"/>
+            <a:off x="332105" y="3192247"/>
             <a:ext cx="11375708" cy="657744"/>
           </a:xfrm>
           <a:prstGeom prst="rect">
@@ -15082,8 +15080,8 @@
         </p:nvSpPr>
         <p:spPr bwMode="auto">
           <a:xfrm>
-            <a:off x="253020" y="5619246"/>
-            <a:ext cx="11548712" cy="1166150"/>
+            <a:off x="248920" y="4318635"/>
+            <a:ext cx="11548745" cy="864235"/>
           </a:xfrm>
           <a:prstGeom prst="rect">
             <a:avLst/>
@@ -15114,7 +15112,7 @@
         </p:nvSpPr>
         <p:spPr>
           <a:xfrm>
-            <a:off x="-13362" y="5361460"/>
+            <a:off x="1243" y="3850160"/>
             <a:ext cx="3740619" cy="468313"/>
           </a:xfrm>
           <a:custGeom>
@@ -15344,7 +15342,7 @@
         </p:nvSpPr>
         <p:spPr>
           <a:xfrm>
-            <a:off x="402879" y="5883417"/>
+            <a:off x="249209" y="4318777"/>
             <a:ext cx="11375708" cy="825034"/>
           </a:xfrm>
           <a:prstGeom prst="rect">
@@ -15467,6 +15465,294 @@
               </a:solidFill>
               <a:cs typeface="AdihausDIN Cn" panose="020B0506020101010102" pitchFamily="34" charset="0"/>
             </a:endParaRPr>
+          </a:p>
+        </p:txBody>
+      </p:sp>
+      <p:sp>
+        <p:nvSpPr>
+          <p:cNvPr id="4" name="TextBox 21"/>
+          <p:cNvSpPr txBox="1"/>
+          <p:nvPr/>
+        </p:nvSpPr>
+        <p:spPr>
+          <a:xfrm>
+            <a:off x="248920" y="5651500"/>
+            <a:ext cx="11458575" cy="901065"/>
+          </a:xfrm>
+          <a:prstGeom prst="rect">
+            <a:avLst/>
+          </a:prstGeom>
+          <a:noFill/>
+        </p:spPr>
+        <p:txBody>
+          <a:bodyPr wrap="square" rtlCol="0">
+            <a:spAutoFit/>
+          </a:bodyPr>
+          <a:p>
+            <a:pPr marL="377825" indent="-377825">
+              <a:spcAft>
+                <a:spcPts val="600"/>
+              </a:spcAft>
+              <a:buFont typeface="+mj-lt"/>
+              <a:buAutoNum type="arabicPeriod"/>
+            </a:pPr>
+            <a:r>
+              <a:rPr lang="en-IN" altLang="en-US" sz="1585" dirty="0" smtClean="0"/>
+              <a:t>Kaggle kernel (please visit the solution here as notebooks contains interactive plots): </a:t>
+            </a:r>
+            <a:r>
+              <a:rPr lang="en-IN" altLang="en-US" sz="1585" dirty="0" smtClean="0">
+                <a:hlinkClick r:id="rId2" tooltip="" action="ppaction://hlinkfile"/>
+              </a:rPr>
+              <a:t>https://www.kaggle.com/mohitkag/nlp-twitter-sentiment-analysis</a:t>
+            </a:r>
+            <a:endParaRPr lang="en-IN" altLang="en-US" sz="1585" dirty="0" smtClean="0"/>
+          </a:p>
+          <a:p>
+            <a:pPr marL="377825" indent="-377825">
+              <a:spcAft>
+                <a:spcPts val="600"/>
+              </a:spcAft>
+              <a:buFont typeface="+mj-lt"/>
+              <a:buAutoNum type="arabicPeriod"/>
+            </a:pPr>
+            <a:r>
+              <a:rPr lang="en-IN" altLang="en-US" sz="1585" dirty="0" smtClean="0"/>
+              <a:t>Github link: </a:t>
+            </a:r>
+            <a:r>
+              <a:rPr lang="en-IN" altLang="en-US" sz="1585" dirty="0" smtClean="0">
+                <a:hlinkClick r:id="rId3" tooltip="" action="ppaction://hlinkfile"/>
+              </a:rPr>
+              <a:t>https://github.com/git-mohit/NLP-Twitter-Customer-Reviews-Analysis</a:t>
+            </a:r>
+            <a:endParaRPr lang="en-IN" altLang="en-US" sz="1585" dirty="0" smtClean="0"/>
+          </a:p>
+        </p:txBody>
+      </p:sp>
+      <p:sp>
+        <p:nvSpPr>
+          <p:cNvPr id="5" name="Rectangle 6"/>
+          <p:cNvSpPr/>
+          <p:nvPr/>
+        </p:nvSpPr>
+        <p:spPr bwMode="auto">
+          <a:xfrm>
+            <a:off x="255270" y="5514975"/>
+            <a:ext cx="11542395" cy="1214755"/>
+          </a:xfrm>
+          <a:prstGeom prst="rect">
+            <a:avLst/>
+          </a:prstGeom>
+          <a:noFill/>
+          <a:ln w="12700">
+            <a:solidFill>
+              <a:schemeClr val="bg1">
+                <a:lumMod val="65000"/>
+              </a:schemeClr>
+            </a:solidFill>
+          </a:ln>
+        </p:spPr>
+        <p:txBody>
+          <a:bodyPr vert="horz" wrap="square" lIns="42863" tIns="21431" rIns="42863" bIns="21431" numCol="1" rtlCol="0" anchor="t" anchorCtr="0" compatLnSpc="1"/>
+          <a:p>
+            <a:pPr algn="ctr"/>
+            <a:endParaRPr lang="en-IN" sz="2380" dirty="0"/>
+          </a:p>
+        </p:txBody>
+      </p:sp>
+      <p:sp>
+        <p:nvSpPr>
+          <p:cNvPr id="3" name="Parallelogram 7"/>
+          <p:cNvSpPr/>
+          <p:nvPr/>
+        </p:nvSpPr>
+        <p:spPr>
+          <a:xfrm>
+            <a:off x="1878" y="5183025"/>
+            <a:ext cx="3740619" cy="468313"/>
+          </a:xfrm>
+          <a:custGeom>
+            <a:avLst/>
+            <a:gdLst>
+              <a:gd name="connsiteX0" fmla="*/ 0 w 2667000"/>
+              <a:gd name="connsiteY0" fmla="*/ 468312 h 468312"/>
+              <a:gd name="connsiteX1" fmla="*/ 193277 w 2667000"/>
+              <a:gd name="connsiteY1" fmla="*/ 0 h 468312"/>
+              <a:gd name="connsiteX2" fmla="*/ 2667000 w 2667000"/>
+              <a:gd name="connsiteY2" fmla="*/ 0 h 468312"/>
+              <a:gd name="connsiteX3" fmla="*/ 2473723 w 2667000"/>
+              <a:gd name="connsiteY3" fmla="*/ 468312 h 468312"/>
+              <a:gd name="connsiteX4" fmla="*/ 0 w 2667000"/>
+              <a:gd name="connsiteY4" fmla="*/ 468312 h 468312"/>
+              <a:gd name="connsiteX0-1" fmla="*/ 9923 w 2676923"/>
+              <a:gd name="connsiteY0-2" fmla="*/ 468312 h 468312"/>
+              <a:gd name="connsiteX1-3" fmla="*/ 0 w 2676923"/>
+              <a:gd name="connsiteY1-4" fmla="*/ 12700 h 468312"/>
+              <a:gd name="connsiteX2-5" fmla="*/ 2676923 w 2676923"/>
+              <a:gd name="connsiteY2-6" fmla="*/ 0 h 468312"/>
+              <a:gd name="connsiteX3-7" fmla="*/ 2483646 w 2676923"/>
+              <a:gd name="connsiteY3-8" fmla="*/ 468312 h 468312"/>
+              <a:gd name="connsiteX4-9" fmla="*/ 9923 w 2676923"/>
+              <a:gd name="connsiteY4-10" fmla="*/ 468312 h 468312"/>
+              <a:gd name="connsiteX0-11" fmla="*/ 3573 w 2676923"/>
+              <a:gd name="connsiteY0-12" fmla="*/ 471487 h 471487"/>
+              <a:gd name="connsiteX1-13" fmla="*/ 0 w 2676923"/>
+              <a:gd name="connsiteY1-14" fmla="*/ 12700 h 471487"/>
+              <a:gd name="connsiteX2-15" fmla="*/ 2676923 w 2676923"/>
+              <a:gd name="connsiteY2-16" fmla="*/ 0 h 471487"/>
+              <a:gd name="connsiteX3-17" fmla="*/ 2483646 w 2676923"/>
+              <a:gd name="connsiteY3-18" fmla="*/ 468312 h 471487"/>
+              <a:gd name="connsiteX4-19" fmla="*/ 3573 w 2676923"/>
+              <a:gd name="connsiteY4-20" fmla="*/ 471487 h 471487"/>
+              <a:gd name="connsiteX0-21" fmla="*/ 398 w 2673748"/>
+              <a:gd name="connsiteY0-22" fmla="*/ 471487 h 471487"/>
+              <a:gd name="connsiteX1-23" fmla="*/ 0 w 2673748"/>
+              <a:gd name="connsiteY1-24" fmla="*/ 6350 h 471487"/>
+              <a:gd name="connsiteX2-25" fmla="*/ 2673748 w 2673748"/>
+              <a:gd name="connsiteY2-26" fmla="*/ 0 h 471487"/>
+              <a:gd name="connsiteX3-27" fmla="*/ 2480471 w 2673748"/>
+              <a:gd name="connsiteY3-28" fmla="*/ 468312 h 471487"/>
+              <a:gd name="connsiteX4-29" fmla="*/ 398 w 2673748"/>
+              <a:gd name="connsiteY4-30" fmla="*/ 471487 h 471487"/>
+              <a:gd name="connsiteX0-31" fmla="*/ 6748 w 2680098"/>
+              <a:gd name="connsiteY0-32" fmla="*/ 471487 h 471487"/>
+              <a:gd name="connsiteX1-33" fmla="*/ 0 w 2680098"/>
+              <a:gd name="connsiteY1-34" fmla="*/ 3175 h 471487"/>
+              <a:gd name="connsiteX2-35" fmla="*/ 2680098 w 2680098"/>
+              <a:gd name="connsiteY2-36" fmla="*/ 0 h 471487"/>
+              <a:gd name="connsiteX3-37" fmla="*/ 2486821 w 2680098"/>
+              <a:gd name="connsiteY3-38" fmla="*/ 468312 h 471487"/>
+              <a:gd name="connsiteX4-39" fmla="*/ 6748 w 2680098"/>
+              <a:gd name="connsiteY4-40" fmla="*/ 471487 h 471487"/>
+              <a:gd name="connsiteX0-41" fmla="*/ 6748 w 2680098"/>
+              <a:gd name="connsiteY0-42" fmla="*/ 471487 h 471487"/>
+              <a:gd name="connsiteX1-43" fmla="*/ 0 w 2680098"/>
+              <a:gd name="connsiteY1-44" fmla="*/ 3175 h 471487"/>
+              <a:gd name="connsiteX2-45" fmla="*/ 2680098 w 2680098"/>
+              <a:gd name="connsiteY2-46" fmla="*/ 0 h 471487"/>
+              <a:gd name="connsiteX3-47" fmla="*/ 2486821 w 2680098"/>
+              <a:gd name="connsiteY3-48" fmla="*/ 468312 h 471487"/>
+              <a:gd name="connsiteX4-49" fmla="*/ 6748 w 2680098"/>
+              <a:gd name="connsiteY4-50" fmla="*/ 471487 h 471487"/>
+              <a:gd name="connsiteX0-51" fmla="*/ 6748 w 2680098"/>
+              <a:gd name="connsiteY0-52" fmla="*/ 471487 h 471487"/>
+              <a:gd name="connsiteX1-53" fmla="*/ 0 w 2680098"/>
+              <a:gd name="connsiteY1-54" fmla="*/ 3175 h 471487"/>
+              <a:gd name="connsiteX2-55" fmla="*/ 2680098 w 2680098"/>
+              <a:gd name="connsiteY2-56" fmla="*/ 0 h 471487"/>
+              <a:gd name="connsiteX3-57" fmla="*/ 2486821 w 2680098"/>
+              <a:gd name="connsiteY3-58" fmla="*/ 468312 h 471487"/>
+              <a:gd name="connsiteX4-59" fmla="*/ 6748 w 2680098"/>
+              <a:gd name="connsiteY4-60" fmla="*/ 471487 h 471487"/>
+              <a:gd name="connsiteX0-61" fmla="*/ 6748 w 2680098"/>
+              <a:gd name="connsiteY0-62" fmla="*/ 471487 h 471487"/>
+              <a:gd name="connsiteX1-63" fmla="*/ 0 w 2680098"/>
+              <a:gd name="connsiteY1-64" fmla="*/ 3175 h 471487"/>
+              <a:gd name="connsiteX2-65" fmla="*/ 2680098 w 2680098"/>
+              <a:gd name="connsiteY2-66" fmla="*/ 0 h 471487"/>
+              <a:gd name="connsiteX3-67" fmla="*/ 2486821 w 2680098"/>
+              <a:gd name="connsiteY3-68" fmla="*/ 468312 h 471487"/>
+              <a:gd name="connsiteX4-69" fmla="*/ 6748 w 2680098"/>
+              <a:gd name="connsiteY4-70" fmla="*/ 471487 h 471487"/>
+              <a:gd name="connsiteX0-71" fmla="*/ 6748 w 2680098"/>
+              <a:gd name="connsiteY0-72" fmla="*/ 468312 h 468312"/>
+              <a:gd name="connsiteX1-73" fmla="*/ 0 w 2680098"/>
+              <a:gd name="connsiteY1-74" fmla="*/ 3175 h 468312"/>
+              <a:gd name="connsiteX2-75" fmla="*/ 2680098 w 2680098"/>
+              <a:gd name="connsiteY2-76" fmla="*/ 0 h 468312"/>
+              <a:gd name="connsiteX3-77" fmla="*/ 2486821 w 2680098"/>
+              <a:gd name="connsiteY3-78" fmla="*/ 468312 h 468312"/>
+              <a:gd name="connsiteX4-79" fmla="*/ 6748 w 2680098"/>
+              <a:gd name="connsiteY4-80" fmla="*/ 468312 h 468312"/>
+              <a:gd name="connsiteX0-81" fmla="*/ 31 w 2680206"/>
+              <a:gd name="connsiteY0-82" fmla="*/ 468312 h 468312"/>
+              <a:gd name="connsiteX1-83" fmla="*/ 108 w 2680206"/>
+              <a:gd name="connsiteY1-84" fmla="*/ 3175 h 468312"/>
+              <a:gd name="connsiteX2-85" fmla="*/ 2680206 w 2680206"/>
+              <a:gd name="connsiteY2-86" fmla="*/ 0 h 468312"/>
+              <a:gd name="connsiteX3-87" fmla="*/ 2486929 w 2680206"/>
+              <a:gd name="connsiteY3-88" fmla="*/ 468312 h 468312"/>
+              <a:gd name="connsiteX4-89" fmla="*/ 31 w 2680206"/>
+              <a:gd name="connsiteY4-90" fmla="*/ 468312 h 468312"/>
+            </a:gdLst>
+            <a:ahLst/>
+            <a:cxnLst>
+              <a:cxn ang="0">
+                <a:pos x="connsiteX0-1" y="connsiteY0-2"/>
+              </a:cxn>
+              <a:cxn ang="0">
+                <a:pos x="connsiteX1-3" y="connsiteY1-4"/>
+              </a:cxn>
+              <a:cxn ang="0">
+                <a:pos x="connsiteX2-5" y="connsiteY2-6"/>
+              </a:cxn>
+              <a:cxn ang="0">
+                <a:pos x="connsiteX3-7" y="connsiteY3-8"/>
+              </a:cxn>
+              <a:cxn ang="0">
+                <a:pos x="connsiteX4-9" y="connsiteY4-10"/>
+              </a:cxn>
+            </a:cxnLst>
+            <a:rect l="l" t="t" r="r" b="b"/>
+            <a:pathLst>
+              <a:path w="2680206" h="468312">
+                <a:moveTo>
+                  <a:pt x="31" y="468312"/>
+                </a:moveTo>
+                <a:cubicBezTo>
+                  <a:pt x="-102" y="313266"/>
+                  <a:pt x="241" y="158221"/>
+                  <a:pt x="108" y="3175"/>
+                </a:cubicBezTo>
+                <a:lnTo>
+                  <a:pt x="2680206" y="0"/>
+                </a:lnTo>
+                <a:lnTo>
+                  <a:pt x="2486929" y="468312"/>
+                </a:lnTo>
+                <a:lnTo>
+                  <a:pt x="31" y="468312"/>
+                </a:lnTo>
+                <a:close/>
+              </a:path>
+            </a:pathLst>
+          </a:custGeom>
+          <a:solidFill>
+            <a:srgbClr val="00B050"/>
+          </a:solidFill>
+          <a:ln>
+            <a:noFill/>
+          </a:ln>
+          <a:effectLst/>
+        </p:spPr>
+        <p:style>
+          <a:lnRef idx="2">
+            <a:schemeClr val="accent1">
+              <a:shade val="50000"/>
+            </a:schemeClr>
+          </a:lnRef>
+          <a:fillRef idx="1">
+            <a:schemeClr val="accent1"/>
+          </a:fillRef>
+          <a:effectRef idx="0">
+            <a:schemeClr val="accent1"/>
+          </a:effectRef>
+          <a:fontRef idx="minor">
+            <a:schemeClr val="lt1"/>
+          </a:fontRef>
+        </p:style>
+        <p:txBody>
+          <a:bodyPr rot="0" spcFirstLastPara="0" vertOverflow="overflow" horzOverflow="overflow" vert="horz" wrap="square" lIns="91440" tIns="45720" rIns="91440" bIns="45720" numCol="1" spcCol="0" rtlCol="0" fromWordArt="0" anchor="ctr" anchorCtr="0" forceAA="0" compatLnSpc="1">
+            <a:noAutofit/>
+          </a:bodyPr>
+          <a:p>
+            <a:pPr marL="342900"/>
+            <a:r>
+              <a:rPr lang="en-IN" sz="2000" b="1" dirty="0"/>
+              <a:t>Solution</a:t>
+            </a:r>
+            <a:endParaRPr lang="en-IN" sz="2000" b="1" dirty="0"/>
           </a:p>
         </p:txBody>
       </p:sp>
@@ -17100,7 +17386,6 @@
             <a:pPr algn="ctr"/>
             <a:r>
               <a:rPr lang="en-IN" altLang="en-US" b="1">
-                <a:ln/>
                 <a:solidFill>
                   <a:schemeClr val="tx1"/>
                 </a:solidFill>
@@ -17115,7 +17400,6 @@
               <a:t>List of Customers with avg. Sentiment scores below threshold</a:t>
             </a:r>
             <a:endParaRPr lang="en-IN" altLang="en-US" b="1">
-              <a:ln/>
               <a:solidFill>
                 <a:schemeClr val="tx1"/>
               </a:solidFill>

</xml_diff>